<commit_message>
Update NET Core og Microservices.pptx
</commit_message>
<xml_diff>
--- a/NET Core og Microservices.pptx
+++ b/NET Core og Microservices.pptx
@@ -5527,7 +5527,7 @@
             </a:r>
             <a:r>
               <a:rPr lang="da-DK" dirty="0" err="1"/>
-              <a:t>replikerering</a:t>
+              <a:t>replikering</a:t>
             </a:r>
             <a:r>
               <a:rPr lang="da-DK" dirty="0"/>
@@ -5561,13 +5561,10 @@
           </a:p>
           <a:p>
             <a:r>
-              <a:rPr lang="da-DK" dirty="0" err="1"/>
-              <a:t>Asynkronitet</a:t>
-            </a:r>
-            <a:r>
-              <a:rPr lang="da-DK" dirty="0"/>
-              <a:t> </a:t>
-            </a:r>
+              <a:rPr lang="da-DK"/>
+              <a:t>Asynkront</a:t>
+            </a:r>
+            <a:endParaRPr lang="da-DK" dirty="0"/>
           </a:p>
         </p:txBody>
       </p:sp>

</xml_diff>